<commit_message>
Add N-Expression to ppt
</commit_message>
<xml_diff>
--- a/Integer Triangle + N expression.pptx
+++ b/Integer Triangle + N expression.pptx
@@ -5,7 +5,7 @@
     <p:sldMasterId id="2147483648" r:id="rId1"/>
   </p:sldMasterIdLst>
   <p:notesMasterIdLst>
-    <p:notesMasterId r:id="rId9"/>
+    <p:notesMasterId r:id="rId10"/>
   </p:notesMasterIdLst>
   <p:sldIdLst>
     <p:sldId id="259" r:id="rId2"/>
@@ -15,6 +15,7 @@
     <p:sldId id="260" r:id="rId6"/>
     <p:sldId id="261" r:id="rId7"/>
     <p:sldId id="262" r:id="rId8"/>
+    <p:sldId id="263" r:id="rId9"/>
   </p:sldIdLst>
   <p:sldSz cx="12192000" cy="6858000"/>
   <p:notesSz cx="6858000" cy="9144000"/>
@@ -203,7 +204,7 @@
           <a:p>
             <a:fld id="{19B34841-F772-4CFF-B60B-2E10C013B91E}" type="datetimeFigureOut">
               <a:rPr lang="ko-KR" altLang="en-US" smtClean="0"/>
-              <a:t>2020-12-27(Sun)</a:t>
+              <a:t>2020-12-28(Mon)</a:t>
             </a:fld>
             <a:endParaRPr lang="ko-KR" altLang="en-US"/>
           </a:p>
@@ -757,7 +758,7 @@
           <a:p>
             <a:fld id="{539D5382-BCB5-4A54-8C71-9D0108EDCF05}" type="datetimeFigureOut">
               <a:rPr lang="ko-KR" altLang="en-US" smtClean="0"/>
-              <a:t>2020-12-27(Sun)</a:t>
+              <a:t>2020-12-28(Mon)</a:t>
             </a:fld>
             <a:endParaRPr lang="ko-KR" altLang="en-US"/>
           </a:p>
@@ -955,7 +956,7 @@
           <a:p>
             <a:fld id="{539D5382-BCB5-4A54-8C71-9D0108EDCF05}" type="datetimeFigureOut">
               <a:rPr lang="ko-KR" altLang="en-US" smtClean="0"/>
-              <a:t>2020-12-27(Sun)</a:t>
+              <a:t>2020-12-28(Mon)</a:t>
             </a:fld>
             <a:endParaRPr lang="ko-KR" altLang="en-US"/>
           </a:p>
@@ -1163,7 +1164,7 @@
           <a:p>
             <a:fld id="{539D5382-BCB5-4A54-8C71-9D0108EDCF05}" type="datetimeFigureOut">
               <a:rPr lang="ko-KR" altLang="en-US" smtClean="0"/>
-              <a:t>2020-12-27(Sun)</a:t>
+              <a:t>2020-12-28(Mon)</a:t>
             </a:fld>
             <a:endParaRPr lang="ko-KR" altLang="en-US"/>
           </a:p>
@@ -1361,7 +1362,7 @@
           <a:p>
             <a:fld id="{539D5382-BCB5-4A54-8C71-9D0108EDCF05}" type="datetimeFigureOut">
               <a:rPr lang="ko-KR" altLang="en-US" smtClean="0"/>
-              <a:t>2020-12-27(Sun)</a:t>
+              <a:t>2020-12-28(Mon)</a:t>
             </a:fld>
             <a:endParaRPr lang="ko-KR" altLang="en-US"/>
           </a:p>
@@ -1636,7 +1637,7 @@
           <a:p>
             <a:fld id="{539D5382-BCB5-4A54-8C71-9D0108EDCF05}" type="datetimeFigureOut">
               <a:rPr lang="ko-KR" altLang="en-US" smtClean="0"/>
-              <a:t>2020-12-27(Sun)</a:t>
+              <a:t>2020-12-28(Mon)</a:t>
             </a:fld>
             <a:endParaRPr lang="ko-KR" altLang="en-US"/>
           </a:p>
@@ -1901,7 +1902,7 @@
           <a:p>
             <a:fld id="{539D5382-BCB5-4A54-8C71-9D0108EDCF05}" type="datetimeFigureOut">
               <a:rPr lang="ko-KR" altLang="en-US" smtClean="0"/>
-              <a:t>2020-12-27(Sun)</a:t>
+              <a:t>2020-12-28(Mon)</a:t>
             </a:fld>
             <a:endParaRPr lang="ko-KR" altLang="en-US"/>
           </a:p>
@@ -2313,7 +2314,7 @@
           <a:p>
             <a:fld id="{539D5382-BCB5-4A54-8C71-9D0108EDCF05}" type="datetimeFigureOut">
               <a:rPr lang="ko-KR" altLang="en-US" smtClean="0"/>
-              <a:t>2020-12-27(Sun)</a:t>
+              <a:t>2020-12-28(Mon)</a:t>
             </a:fld>
             <a:endParaRPr lang="ko-KR" altLang="en-US"/>
           </a:p>
@@ -2454,7 +2455,7 @@
           <a:p>
             <a:fld id="{539D5382-BCB5-4A54-8C71-9D0108EDCF05}" type="datetimeFigureOut">
               <a:rPr lang="ko-KR" altLang="en-US" smtClean="0"/>
-              <a:t>2020-12-27(Sun)</a:t>
+              <a:t>2020-12-28(Mon)</a:t>
             </a:fld>
             <a:endParaRPr lang="ko-KR" altLang="en-US"/>
           </a:p>
@@ -2567,7 +2568,7 @@
           <a:p>
             <a:fld id="{539D5382-BCB5-4A54-8C71-9D0108EDCF05}" type="datetimeFigureOut">
               <a:rPr lang="ko-KR" altLang="en-US" smtClean="0"/>
-              <a:t>2020-12-27(Sun)</a:t>
+              <a:t>2020-12-28(Mon)</a:t>
             </a:fld>
             <a:endParaRPr lang="ko-KR" altLang="en-US"/>
           </a:p>
@@ -2878,7 +2879,7 @@
           <a:p>
             <a:fld id="{539D5382-BCB5-4A54-8C71-9D0108EDCF05}" type="datetimeFigureOut">
               <a:rPr lang="ko-KR" altLang="en-US" smtClean="0"/>
-              <a:t>2020-12-27(Sun)</a:t>
+              <a:t>2020-12-28(Mon)</a:t>
             </a:fld>
             <a:endParaRPr lang="ko-KR" altLang="en-US"/>
           </a:p>
@@ -3166,7 +3167,7 @@
           <a:p>
             <a:fld id="{539D5382-BCB5-4A54-8C71-9D0108EDCF05}" type="datetimeFigureOut">
               <a:rPr lang="ko-KR" altLang="en-US" smtClean="0"/>
-              <a:t>2020-12-27(Sun)</a:t>
+              <a:t>2020-12-28(Mon)</a:t>
             </a:fld>
             <a:endParaRPr lang="ko-KR" altLang="en-US"/>
           </a:p>
@@ -3412,7 +3413,7 @@
           <a:p>
             <a:fld id="{539D5382-BCB5-4A54-8C71-9D0108EDCF05}" type="datetimeFigureOut">
               <a:rPr lang="ko-KR" altLang="en-US" smtClean="0"/>
-              <a:t>2020-12-27(Sun)</a:t>
+              <a:t>2020-12-28(Mon)</a:t>
             </a:fld>
             <a:endParaRPr lang="ko-KR" altLang="en-US"/>
           </a:p>
@@ -5192,14 +5193,23 @@
           <a:p>
             <a:pPr algn="ctr"/>
             <a:r>
-              <a:rPr lang="en-US" altLang="ko-KR" sz="4800" dirty="0"/>
+              <a:rPr lang="en-US" altLang="ko-KR" sz="4800" dirty="0">
+                <a:latin typeface="a고딕12" panose="02020600000000000000" pitchFamily="18" charset="-127"/>
+                <a:ea typeface="a고딕12" panose="02020600000000000000" pitchFamily="18" charset="-127"/>
+              </a:rPr>
               <a:t>triangle == </a:t>
             </a:r>
             <a:r>
-              <a:rPr lang="en-US" altLang="ko-KR" sz="4800" dirty="0" err="1"/>
+              <a:rPr lang="en-US" altLang="ko-KR" sz="4800" dirty="0" err="1">
+                <a:latin typeface="a고딕12" panose="02020600000000000000" pitchFamily="18" charset="-127"/>
+                <a:ea typeface="a고딕12" panose="02020600000000000000" pitchFamily="18" charset="-127"/>
+              </a:rPr>
               <a:t>dp</a:t>
             </a:r>
-            <a:endParaRPr lang="ko-KR" altLang="en-US" sz="4800" dirty="0"/>
+            <a:endParaRPr lang="ko-KR" altLang="en-US" sz="4800" dirty="0">
+              <a:latin typeface="a고딕12" panose="02020600000000000000" pitchFamily="18" charset="-127"/>
+              <a:ea typeface="a고딕12" panose="02020600000000000000" pitchFamily="18" charset="-127"/>
+            </a:endParaRPr>
           </a:p>
         </p:txBody>
       </p:sp>
@@ -5246,10 +5256,16 @@
           <a:p>
             <a:pPr algn="ctr"/>
             <a:r>
-              <a:rPr lang="en-US" altLang="ko-KR" dirty="0"/>
+              <a:rPr lang="en-US" altLang="ko-KR" dirty="0">
+                <a:latin typeface="a고딕12" panose="02020600000000000000" pitchFamily="18" charset="-127"/>
+                <a:ea typeface="a고딕12" panose="02020600000000000000" pitchFamily="18" charset="-127"/>
+              </a:rPr>
               <a:t>8</a:t>
             </a:r>
-            <a:endParaRPr lang="ko-KR" altLang="en-US" dirty="0"/>
+            <a:endParaRPr lang="ko-KR" altLang="en-US" dirty="0">
+              <a:latin typeface="a고딕12" panose="02020600000000000000" pitchFamily="18" charset="-127"/>
+              <a:ea typeface="a고딕12" panose="02020600000000000000" pitchFamily="18" charset="-127"/>
+            </a:endParaRPr>
           </a:p>
         </p:txBody>
       </p:sp>
@@ -5296,10 +5312,16 @@
           <a:p>
             <a:pPr algn="ctr"/>
             <a:r>
-              <a:rPr lang="en-US" altLang="ko-KR" dirty="0"/>
+              <a:rPr lang="en-US" altLang="ko-KR" dirty="0">
+                <a:latin typeface="a고딕12" panose="02020600000000000000" pitchFamily="18" charset="-127"/>
+                <a:ea typeface="a고딕12" panose="02020600000000000000" pitchFamily="18" charset="-127"/>
+              </a:rPr>
               <a:t>1</a:t>
             </a:r>
-            <a:endParaRPr lang="ko-KR" altLang="en-US" dirty="0"/>
+            <a:endParaRPr lang="ko-KR" altLang="en-US" dirty="0">
+              <a:latin typeface="a고딕12" panose="02020600000000000000" pitchFamily="18" charset="-127"/>
+              <a:ea typeface="a고딕12" panose="02020600000000000000" pitchFamily="18" charset="-127"/>
+            </a:endParaRPr>
           </a:p>
         </p:txBody>
       </p:sp>
@@ -5346,10 +5368,16 @@
           <a:p>
             <a:pPr algn="ctr"/>
             <a:r>
-              <a:rPr lang="en-US" altLang="ko-KR" dirty="0"/>
+              <a:rPr lang="en-US" altLang="ko-KR" dirty="0">
+                <a:latin typeface="a고딕12" panose="02020600000000000000" pitchFamily="18" charset="-127"/>
+                <a:ea typeface="a고딕12" panose="02020600000000000000" pitchFamily="18" charset="-127"/>
+              </a:rPr>
               <a:t>0</a:t>
             </a:r>
-            <a:endParaRPr lang="ko-KR" altLang="en-US" dirty="0"/>
+            <a:endParaRPr lang="ko-KR" altLang="en-US" dirty="0">
+              <a:latin typeface="a고딕12" panose="02020600000000000000" pitchFamily="18" charset="-127"/>
+              <a:ea typeface="a고딕12" panose="02020600000000000000" pitchFamily="18" charset="-127"/>
+            </a:endParaRPr>
           </a:p>
         </p:txBody>
       </p:sp>
@@ -5396,10 +5424,16 @@
           <a:p>
             <a:pPr algn="ctr"/>
             <a:r>
-              <a:rPr lang="en-US" altLang="ko-KR" dirty="0"/>
+              <a:rPr lang="en-US" altLang="ko-KR" dirty="0">
+                <a:latin typeface="a고딕12" panose="02020600000000000000" pitchFamily="18" charset="-127"/>
+                <a:ea typeface="a고딕12" panose="02020600000000000000" pitchFamily="18" charset="-127"/>
+              </a:rPr>
               <a:t>3</a:t>
             </a:r>
-            <a:endParaRPr lang="ko-KR" altLang="en-US" dirty="0"/>
+            <a:endParaRPr lang="ko-KR" altLang="en-US" dirty="0">
+              <a:latin typeface="a고딕12" panose="02020600000000000000" pitchFamily="18" charset="-127"/>
+              <a:ea typeface="a고딕12" panose="02020600000000000000" pitchFamily="18" charset="-127"/>
+            </a:endParaRPr>
           </a:p>
         </p:txBody>
       </p:sp>
@@ -5446,10 +5480,16 @@
           <a:p>
             <a:pPr algn="ctr"/>
             <a:r>
-              <a:rPr lang="en-US" altLang="ko-KR" dirty="0"/>
+              <a:rPr lang="en-US" altLang="ko-KR" dirty="0">
+                <a:latin typeface="a고딕12" panose="02020600000000000000" pitchFamily="18" charset="-127"/>
+                <a:ea typeface="a고딕12" panose="02020600000000000000" pitchFamily="18" charset="-127"/>
+              </a:rPr>
               <a:t>8</a:t>
             </a:r>
-            <a:endParaRPr lang="ko-KR" altLang="en-US" dirty="0"/>
+            <a:endParaRPr lang="ko-KR" altLang="en-US" dirty="0">
+              <a:latin typeface="a고딕12" panose="02020600000000000000" pitchFamily="18" charset="-127"/>
+              <a:ea typeface="a고딕12" panose="02020600000000000000" pitchFamily="18" charset="-127"/>
+            </a:endParaRPr>
           </a:p>
         </p:txBody>
       </p:sp>
@@ -5496,10 +5536,16 @@
           <a:p>
             <a:pPr algn="ctr"/>
             <a:r>
-              <a:rPr lang="en-US" altLang="ko-KR" dirty="0"/>
+              <a:rPr lang="en-US" altLang="ko-KR" dirty="0">
+                <a:latin typeface="a고딕12" panose="02020600000000000000" pitchFamily="18" charset="-127"/>
+                <a:ea typeface="a고딕12" panose="02020600000000000000" pitchFamily="18" charset="-127"/>
+              </a:rPr>
               <a:t>7</a:t>
             </a:r>
-            <a:endParaRPr lang="ko-KR" altLang="en-US" dirty="0"/>
+            <a:endParaRPr lang="ko-KR" altLang="en-US" dirty="0">
+              <a:latin typeface="a고딕12" panose="02020600000000000000" pitchFamily="18" charset="-127"/>
+              <a:ea typeface="a고딕12" panose="02020600000000000000" pitchFamily="18" charset="-127"/>
+            </a:endParaRPr>
           </a:p>
         </p:txBody>
       </p:sp>
@@ -5783,10 +5829,494 @@
           <a:chExt cx="0" cy="0"/>
         </a:xfrm>
       </p:grpSpPr>
+      <p:cxnSp>
+        <p:nvCxnSpPr>
+          <p:cNvPr id="2" name="직선 연결선 1">
+            <a:extLst>
+              <a:ext uri="{FF2B5EF4-FFF2-40B4-BE49-F238E27FC236}">
+                <a16:creationId xmlns:a16="http://schemas.microsoft.com/office/drawing/2014/main" id="{0C794D81-62A6-437E-8D90-9E83F7441545}"/>
+              </a:ext>
+            </a:extLst>
+          </p:cNvPr>
+          <p:cNvCxnSpPr/>
+          <p:nvPr/>
+        </p:nvCxnSpPr>
+        <p:spPr>
+          <a:xfrm>
+            <a:off x="1503123" y="1152395"/>
+            <a:ext cx="9169052" cy="0"/>
+          </a:xfrm>
+          <a:prstGeom prst="line">
+            <a:avLst/>
+          </a:prstGeom>
+          <a:ln>
+            <a:solidFill>
+              <a:schemeClr val="tx1"/>
+            </a:solidFill>
+          </a:ln>
+        </p:spPr>
+        <p:style>
+          <a:lnRef idx="1">
+            <a:schemeClr val="accent1"/>
+          </a:lnRef>
+          <a:fillRef idx="0">
+            <a:schemeClr val="accent1"/>
+          </a:fillRef>
+          <a:effectRef idx="0">
+            <a:schemeClr val="accent1"/>
+          </a:effectRef>
+          <a:fontRef idx="minor">
+            <a:schemeClr val="tx1"/>
+          </a:fontRef>
+        </p:style>
+      </p:cxnSp>
+      <p:sp>
+        <p:nvSpPr>
+          <p:cNvPr id="3" name="TextBox 2">
+            <a:extLst>
+              <a:ext uri="{FF2B5EF4-FFF2-40B4-BE49-F238E27FC236}">
+                <a16:creationId xmlns:a16="http://schemas.microsoft.com/office/drawing/2014/main" id="{E7F91279-D1E2-429B-B4CB-F934CD623DCE}"/>
+              </a:ext>
+            </a:extLst>
+          </p:cNvPr>
+          <p:cNvSpPr txBox="1"/>
+          <p:nvPr/>
+        </p:nvSpPr>
+        <p:spPr>
+          <a:xfrm>
+            <a:off x="3269294" y="312813"/>
+            <a:ext cx="5073041" cy="584775"/>
+          </a:xfrm>
+          <a:prstGeom prst="rect">
+            <a:avLst/>
+          </a:prstGeom>
+          <a:noFill/>
+        </p:spPr>
+        <p:txBody>
+          <a:bodyPr wrap="square" rtlCol="0">
+            <a:spAutoFit/>
+          </a:bodyPr>
+          <a:lstStyle/>
+          <a:p>
+            <a:pPr algn="ctr"/>
+            <a:r>
+              <a:rPr lang="ko-KR" altLang="en-US" sz="3200" dirty="0">
+                <a:latin typeface="a고딕12" panose="02020600000000000000" pitchFamily="18" charset="-127"/>
+                <a:ea typeface="a고딕12" panose="02020600000000000000" pitchFamily="18" charset="-127"/>
+              </a:rPr>
+              <a:t>문제 해결 흐름</a:t>
+            </a:r>
+          </a:p>
+        </p:txBody>
+      </p:sp>
+      <p:sp>
+        <p:nvSpPr>
+          <p:cNvPr id="7" name="TextBox 6">
+            <a:extLst>
+              <a:ext uri="{FF2B5EF4-FFF2-40B4-BE49-F238E27FC236}">
+                <a16:creationId xmlns:a16="http://schemas.microsoft.com/office/drawing/2014/main" id="{B948832F-95D4-411D-88A3-75811BD86E82}"/>
+              </a:ext>
+            </a:extLst>
+          </p:cNvPr>
+          <p:cNvSpPr txBox="1"/>
+          <p:nvPr/>
+        </p:nvSpPr>
+        <p:spPr>
+          <a:xfrm>
+            <a:off x="2547047" y="1349244"/>
+            <a:ext cx="6506817" cy="830997"/>
+          </a:xfrm>
+          <a:prstGeom prst="rect">
+            <a:avLst/>
+          </a:prstGeom>
+          <a:noFill/>
+        </p:spPr>
+        <p:txBody>
+          <a:bodyPr wrap="square" rtlCol="0">
+            <a:spAutoFit/>
+          </a:bodyPr>
+          <a:lstStyle/>
+          <a:p>
+            <a:pPr algn="ctr"/>
+            <a:r>
+              <a:rPr lang="en-US" altLang="ko-KR" sz="4800" dirty="0">
+                <a:latin typeface="a고딕12" panose="02020600000000000000" pitchFamily="18" charset="-127"/>
+                <a:ea typeface="a고딕12" panose="02020600000000000000" pitchFamily="18" charset="-127"/>
+              </a:rPr>
+              <a:t>N =5</a:t>
+            </a:r>
+            <a:endParaRPr lang="ko-KR" altLang="en-US" sz="4800" dirty="0">
+              <a:latin typeface="a고딕12" panose="02020600000000000000" pitchFamily="18" charset="-127"/>
+              <a:ea typeface="a고딕12" panose="02020600000000000000" pitchFamily="18" charset="-127"/>
+            </a:endParaRPr>
+          </a:p>
+        </p:txBody>
+      </p:sp>
+      <p:sp>
+        <p:nvSpPr>
+          <p:cNvPr id="8" name="TextBox 7">
+            <a:extLst>
+              <a:ext uri="{FF2B5EF4-FFF2-40B4-BE49-F238E27FC236}">
+                <a16:creationId xmlns:a16="http://schemas.microsoft.com/office/drawing/2014/main" id="{25C12199-C31C-41A5-B2F8-BB0D56124E3E}"/>
+              </a:ext>
+            </a:extLst>
+          </p:cNvPr>
+          <p:cNvSpPr txBox="1"/>
+          <p:nvPr/>
+        </p:nvSpPr>
+        <p:spPr>
+          <a:xfrm>
+            <a:off x="1206500" y="2435590"/>
+            <a:ext cx="1340547" cy="954107"/>
+          </a:xfrm>
+          <a:prstGeom prst="rect">
+            <a:avLst/>
+          </a:prstGeom>
+          <a:noFill/>
+        </p:spPr>
+        <p:txBody>
+          <a:bodyPr wrap="square" rtlCol="0">
+            <a:spAutoFit/>
+          </a:bodyPr>
+          <a:lstStyle/>
+          <a:p>
+            <a:r>
+              <a:rPr lang="en-US" altLang="ko-KR" sz="2800" dirty="0">
+                <a:latin typeface="a고딕12" panose="02020600000000000000" pitchFamily="18" charset="-127"/>
+                <a:ea typeface="a고딕12" panose="02020600000000000000" pitchFamily="18" charset="-127"/>
+              </a:rPr>
+              <a:t>1</a:t>
+            </a:r>
+            <a:r>
+              <a:rPr lang="ko-KR" altLang="en-US" sz="2800" dirty="0">
+                <a:latin typeface="a고딕12" panose="02020600000000000000" pitchFamily="18" charset="-127"/>
+                <a:ea typeface="a고딕12" panose="02020600000000000000" pitchFamily="18" charset="-127"/>
+              </a:rPr>
+              <a:t>번 </a:t>
+            </a:r>
+            <a:r>
+              <a:rPr lang="en-US" altLang="ko-KR" sz="2800" dirty="0">
+                <a:latin typeface="a고딕12" panose="02020600000000000000" pitchFamily="18" charset="-127"/>
+                <a:ea typeface="a고딕12" panose="02020600000000000000" pitchFamily="18" charset="-127"/>
+              </a:rPr>
+              <a:t>set</a:t>
+            </a:r>
+          </a:p>
+          <a:p>
+            <a:r>
+              <a:rPr lang="en-US" altLang="ko-KR" sz="2800" dirty="0">
+                <a:latin typeface="a고딕12" panose="02020600000000000000" pitchFamily="18" charset="-127"/>
+                <a:ea typeface="a고딕12" panose="02020600000000000000" pitchFamily="18" charset="-127"/>
+              </a:rPr>
+              <a:t>5</a:t>
+            </a:r>
+          </a:p>
+        </p:txBody>
+      </p:sp>
+      <p:sp>
+        <p:nvSpPr>
+          <p:cNvPr id="9" name="TextBox 8">
+            <a:extLst>
+              <a:ext uri="{FF2B5EF4-FFF2-40B4-BE49-F238E27FC236}">
+                <a16:creationId xmlns:a16="http://schemas.microsoft.com/office/drawing/2014/main" id="{12C4A3E7-62EC-4828-9291-8DA7D67D85FF}"/>
+              </a:ext>
+            </a:extLst>
+          </p:cNvPr>
+          <p:cNvSpPr txBox="1"/>
+          <p:nvPr/>
+        </p:nvSpPr>
+        <p:spPr>
+          <a:xfrm>
+            <a:off x="2819400" y="2435590"/>
+            <a:ext cx="3124200" cy="1384995"/>
+          </a:xfrm>
+          <a:prstGeom prst="rect">
+            <a:avLst/>
+          </a:prstGeom>
+          <a:noFill/>
+        </p:spPr>
+        <p:txBody>
+          <a:bodyPr wrap="square" rtlCol="0">
+            <a:spAutoFit/>
+          </a:bodyPr>
+          <a:lstStyle/>
+          <a:p>
+            <a:r>
+              <a:rPr lang="en-US" altLang="ko-KR" sz="2800" dirty="0">
+                <a:latin typeface="a고딕12" panose="02020600000000000000" pitchFamily="18" charset="-127"/>
+                <a:ea typeface="a고딕12" panose="02020600000000000000" pitchFamily="18" charset="-127"/>
+              </a:rPr>
+              <a:t>2</a:t>
+            </a:r>
+            <a:r>
+              <a:rPr lang="ko-KR" altLang="en-US" sz="2800" dirty="0">
+                <a:latin typeface="a고딕12" panose="02020600000000000000" pitchFamily="18" charset="-127"/>
+                <a:ea typeface="a고딕12" panose="02020600000000000000" pitchFamily="18" charset="-127"/>
+              </a:rPr>
+              <a:t>번 </a:t>
+            </a:r>
+            <a:r>
+              <a:rPr lang="en-US" altLang="ko-KR" sz="2800" dirty="0">
+                <a:latin typeface="a고딕12" panose="02020600000000000000" pitchFamily="18" charset="-127"/>
+                <a:ea typeface="a고딕12" panose="02020600000000000000" pitchFamily="18" charset="-127"/>
+              </a:rPr>
+              <a:t>set</a:t>
+            </a:r>
+          </a:p>
+          <a:p>
+            <a:r>
+              <a:rPr lang="en-US" altLang="ko-KR" sz="2800" dirty="0">
+                <a:latin typeface="a고딕12" panose="02020600000000000000" pitchFamily="18" charset="-127"/>
+                <a:ea typeface="a고딕12" panose="02020600000000000000" pitchFamily="18" charset="-127"/>
+              </a:rPr>
+              <a:t>55,</a:t>
+            </a:r>
+          </a:p>
+          <a:p>
+            <a:r>
+              <a:rPr lang="en-US" altLang="ko-KR" sz="2800" dirty="0">
+                <a:latin typeface="a고딕12" panose="02020600000000000000" pitchFamily="18" charset="-127"/>
+                <a:ea typeface="a고딕12" panose="02020600000000000000" pitchFamily="18" charset="-127"/>
+              </a:rPr>
+              <a:t>5+5, 5-5, 5*5, 5/5 </a:t>
+            </a:r>
+          </a:p>
+        </p:txBody>
+      </p:sp>
+      <p:sp>
+        <p:nvSpPr>
+          <p:cNvPr id="10" name="TextBox 9">
+            <a:extLst>
+              <a:ext uri="{FF2B5EF4-FFF2-40B4-BE49-F238E27FC236}">
+                <a16:creationId xmlns:a16="http://schemas.microsoft.com/office/drawing/2014/main" id="{A57FF7F5-5AC3-4DBD-B3D7-19DD9F4EB2CC}"/>
+              </a:ext>
+            </a:extLst>
+          </p:cNvPr>
+          <p:cNvSpPr txBox="1"/>
+          <p:nvPr/>
+        </p:nvSpPr>
+        <p:spPr>
+          <a:xfrm>
+            <a:off x="6215952" y="2435590"/>
+            <a:ext cx="4185347" cy="1815882"/>
+          </a:xfrm>
+          <a:prstGeom prst="rect">
+            <a:avLst/>
+          </a:prstGeom>
+          <a:noFill/>
+        </p:spPr>
+        <p:txBody>
+          <a:bodyPr wrap="square" rtlCol="0">
+            <a:spAutoFit/>
+          </a:bodyPr>
+          <a:lstStyle/>
+          <a:p>
+            <a:r>
+              <a:rPr lang="en-US" altLang="ko-KR" sz="2800" dirty="0">
+                <a:latin typeface="a고딕12" panose="02020600000000000000" pitchFamily="18" charset="-127"/>
+                <a:ea typeface="a고딕12" panose="02020600000000000000" pitchFamily="18" charset="-127"/>
+              </a:rPr>
+              <a:t>3</a:t>
+            </a:r>
+            <a:r>
+              <a:rPr lang="ko-KR" altLang="en-US" sz="2800" dirty="0">
+                <a:latin typeface="a고딕12" panose="02020600000000000000" pitchFamily="18" charset="-127"/>
+                <a:ea typeface="a고딕12" panose="02020600000000000000" pitchFamily="18" charset="-127"/>
+              </a:rPr>
+              <a:t>번 </a:t>
+            </a:r>
+            <a:r>
+              <a:rPr lang="en-US" altLang="ko-KR" sz="2800" dirty="0">
+                <a:latin typeface="a고딕12" panose="02020600000000000000" pitchFamily="18" charset="-127"/>
+                <a:ea typeface="a고딕12" panose="02020600000000000000" pitchFamily="18" charset="-127"/>
+              </a:rPr>
+              <a:t>set</a:t>
+            </a:r>
+          </a:p>
+          <a:p>
+            <a:r>
+              <a:rPr lang="en-US" altLang="ko-KR" sz="2800" dirty="0">
+                <a:latin typeface="a고딕12" panose="02020600000000000000" pitchFamily="18" charset="-127"/>
+                <a:ea typeface="a고딕12" panose="02020600000000000000" pitchFamily="18" charset="-127"/>
+              </a:rPr>
+              <a:t>555,</a:t>
+            </a:r>
+          </a:p>
+          <a:p>
+            <a:r>
+              <a:rPr lang="en-US" altLang="ko-KR" sz="2800" dirty="0">
+                <a:latin typeface="a고딕12" panose="02020600000000000000" pitchFamily="18" charset="-127"/>
+                <a:ea typeface="a고딕12" panose="02020600000000000000" pitchFamily="18" charset="-127"/>
+              </a:rPr>
+              <a:t>55+5, 55-5, 55*5, 55/5</a:t>
+            </a:r>
+          </a:p>
+          <a:p>
+            <a:r>
+              <a:rPr lang="en-US" altLang="ko-KR" sz="2800" dirty="0">
+                <a:latin typeface="a고딕12" panose="02020600000000000000" pitchFamily="18" charset="-127"/>
+                <a:ea typeface="a고딕12" panose="02020600000000000000" pitchFamily="18" charset="-127"/>
+              </a:rPr>
+              <a:t>5+55, 5-55, 5*55, 5/55 </a:t>
+            </a:r>
+          </a:p>
+        </p:txBody>
+      </p:sp>
+      <p:sp>
+        <p:nvSpPr>
+          <p:cNvPr id="11" name="TextBox 10">
+            <a:extLst>
+              <a:ext uri="{FF2B5EF4-FFF2-40B4-BE49-F238E27FC236}">
+                <a16:creationId xmlns:a16="http://schemas.microsoft.com/office/drawing/2014/main" id="{2AC7DB87-3D3C-4C04-AA3A-64769A6C4AB1}"/>
+              </a:ext>
+            </a:extLst>
+          </p:cNvPr>
+          <p:cNvSpPr txBox="1"/>
+          <p:nvPr/>
+        </p:nvSpPr>
+        <p:spPr>
+          <a:xfrm>
+            <a:off x="4156988" y="4441642"/>
+            <a:ext cx="4185347" cy="2246769"/>
+          </a:xfrm>
+          <a:prstGeom prst="rect">
+            <a:avLst/>
+          </a:prstGeom>
+          <a:noFill/>
+        </p:spPr>
+        <p:txBody>
+          <a:bodyPr wrap="square" rtlCol="0">
+            <a:spAutoFit/>
+          </a:bodyPr>
+          <a:lstStyle/>
+          <a:p>
+            <a:r>
+              <a:rPr lang="en-US" altLang="ko-KR" sz="2800" dirty="0">
+                <a:latin typeface="a고딕12" panose="02020600000000000000" pitchFamily="18" charset="-127"/>
+                <a:ea typeface="a고딕12" panose="02020600000000000000" pitchFamily="18" charset="-127"/>
+              </a:rPr>
+              <a:t>n</a:t>
+            </a:r>
+            <a:r>
+              <a:rPr lang="ko-KR" altLang="en-US" sz="2800" dirty="0">
+                <a:latin typeface="a고딕12" panose="02020600000000000000" pitchFamily="18" charset="-127"/>
+                <a:ea typeface="a고딕12" panose="02020600000000000000" pitchFamily="18" charset="-127"/>
+              </a:rPr>
+              <a:t>번</a:t>
+            </a:r>
+            <a:endParaRPr lang="en-US" altLang="ko-KR" sz="2800" dirty="0">
+              <a:latin typeface="a고딕12" panose="02020600000000000000" pitchFamily="18" charset="-127"/>
+              <a:ea typeface="a고딕12" panose="02020600000000000000" pitchFamily="18" charset="-127"/>
+            </a:endParaRPr>
+          </a:p>
+          <a:p>
+            <a:r>
+              <a:rPr lang="en-US" altLang="ko-KR" sz="2800" dirty="0">
+                <a:latin typeface="a고딕12" panose="02020600000000000000" pitchFamily="18" charset="-127"/>
+                <a:ea typeface="a고딕12" panose="02020600000000000000" pitchFamily="18" charset="-127"/>
+              </a:rPr>
+              <a:t>5…5</a:t>
+            </a:r>
+          </a:p>
+          <a:p>
+            <a:r>
+              <a:rPr lang="en-US" altLang="ko-KR" sz="2800" dirty="0">
+                <a:latin typeface="a고딕12" panose="02020600000000000000" pitchFamily="18" charset="-127"/>
+                <a:ea typeface="a고딕12" panose="02020600000000000000" pitchFamily="18" charset="-127"/>
+              </a:rPr>
+              <a:t>1set # n-1set</a:t>
+            </a:r>
+          </a:p>
+          <a:p>
+            <a:r>
+              <a:rPr lang="en-US" altLang="ko-KR" sz="2800" dirty="0">
+                <a:latin typeface="a고딕12" panose="02020600000000000000" pitchFamily="18" charset="-127"/>
+                <a:ea typeface="a고딕12" panose="02020600000000000000" pitchFamily="18" charset="-127"/>
+              </a:rPr>
+              <a:t>2set # n-2set</a:t>
+            </a:r>
+          </a:p>
+          <a:p>
+            <a:r>
+              <a:rPr lang="en-US" altLang="ko-KR" sz="2800" dirty="0">
+                <a:latin typeface="a고딕12" panose="02020600000000000000" pitchFamily="18" charset="-127"/>
+                <a:ea typeface="a고딕12" panose="02020600000000000000" pitchFamily="18" charset="-127"/>
+              </a:rPr>
+              <a:t>…</a:t>
+            </a:r>
+          </a:p>
+        </p:txBody>
+      </p:sp>
     </p:spTree>
     <p:extLst>
       <p:ext uri="{BB962C8B-B14F-4D97-AF65-F5344CB8AC3E}">
         <p14:creationId xmlns:p14="http://schemas.microsoft.com/office/powerpoint/2010/main" val="3176911210"/>
+      </p:ext>
+    </p:extLst>
+  </p:cSld>
+  <p:clrMapOvr>
+    <a:masterClrMapping/>
+  </p:clrMapOvr>
+</p:sld>
+</file>
+
+<file path=ppt/slides/slide8.xml><?xml version="1.0" encoding="utf-8"?>
+<p:sld xmlns:a="http://schemas.openxmlformats.org/drawingml/2006/main" xmlns:r="http://schemas.openxmlformats.org/officeDocument/2006/relationships" xmlns:p="http://schemas.openxmlformats.org/presentationml/2006/main">
+  <p:cSld>
+    <p:spTree>
+      <p:nvGrpSpPr>
+        <p:cNvPr id="1" name=""/>
+        <p:cNvGrpSpPr/>
+        <p:nvPr/>
+      </p:nvGrpSpPr>
+      <p:grpSpPr>
+        <a:xfrm>
+          <a:off x="0" y="0"/>
+          <a:ext cx="0" cy="0"/>
+          <a:chOff x="0" y="0"/>
+          <a:chExt cx="0" cy="0"/>
+        </a:xfrm>
+      </p:grpSpPr>
+      <p:pic>
+        <p:nvPicPr>
+          <p:cNvPr id="4" name="그림 3">
+            <a:extLst>
+              <a:ext uri="{FF2B5EF4-FFF2-40B4-BE49-F238E27FC236}">
+                <a16:creationId xmlns:a16="http://schemas.microsoft.com/office/drawing/2014/main" id="{7F7F86F8-8B05-4D66-BE4D-2D06242390C5}"/>
+              </a:ext>
+            </a:extLst>
+          </p:cNvPr>
+          <p:cNvPicPr>
+            <a:picLocks noChangeAspect="1"/>
+          </p:cNvPicPr>
+          <p:nvPr/>
+        </p:nvPicPr>
+        <p:blipFill>
+          <a:blip r:embed="rId2">
+            <a:extLst>
+              <a:ext uri="{28A0092B-C50C-407E-A947-70E740481C1C}">
+                <a14:useLocalDpi xmlns:a14="http://schemas.microsoft.com/office/drawing/2010/main" val="0"/>
+              </a:ext>
+            </a:extLst>
+          </a:blip>
+          <a:stretch>
+            <a:fillRect/>
+          </a:stretch>
+        </p:blipFill>
+        <p:spPr>
+          <a:xfrm>
+            <a:off x="3540853" y="0"/>
+            <a:ext cx="5110294" cy="6858000"/>
+          </a:xfrm>
+          <a:prstGeom prst="rect">
+            <a:avLst/>
+          </a:prstGeom>
+        </p:spPr>
+      </p:pic>
+    </p:spTree>
+    <p:extLst>
+      <p:ext uri="{BB962C8B-B14F-4D97-AF65-F5344CB8AC3E}">
+        <p14:creationId xmlns:p14="http://schemas.microsoft.com/office/powerpoint/2010/main" val="1550614017"/>
       </p:ext>
     </p:extLst>
   </p:cSld>

</xml_diff>